<commit_message>
add r notebook and update ppt
</commit_message>
<xml_diff>
--- a/Github and jupyter.pptx
+++ b/Github and jupyter.pptx
@@ -7,8 +7,8 @@
   <p:sldIdLst>
     <p:sldId id="256" r:id="rId2"/>
     <p:sldId id="260" r:id="rId3"/>
-    <p:sldId id="261" r:id="rId4"/>
-    <p:sldId id="262" r:id="rId5"/>
+    <p:sldId id="262" r:id="rId4"/>
+    <p:sldId id="261" r:id="rId5"/>
     <p:sldId id="263" r:id="rId6"/>
     <p:sldId id="259" r:id="rId7"/>
     <p:sldId id="257" r:id="rId8"/>
@@ -285,7 +285,7 @@
           <a:p>
             <a:fld id="{72EA7947-E287-4738-8C82-07CE4F01EF03}" type="datetime2">
               <a:rPr lang="en-US" smtClean="0"/>
-              <a:t>Friday, April 9, 2021</a:t>
+              <a:t>Monday, April 12, 2021</a:t>
             </a:fld>
             <a:endParaRPr lang="en-US" dirty="0"/>
           </a:p>
@@ -1321,7 +1321,7 @@
           <a:p>
             <a:fld id="{EE2EBD84-71F4-4271-8C46-0D47C0A9B12E}" type="datetime2">
               <a:rPr lang="en-US" smtClean="0"/>
-              <a:t>Friday, April 9, 2021</a:t>
+              <a:t>Monday, April 12, 2021</a:t>
             </a:fld>
             <a:endParaRPr lang="en-US"/>
           </a:p>
@@ -1532,7 +1532,7 @@
           <a:p>
             <a:fld id="{ABAE0CE1-F450-4107-B2CB-17B18F8A3F4A}" type="datetime2">
               <a:rPr lang="en-US" smtClean="0"/>
-              <a:t>Friday, April 9, 2021</a:t>
+              <a:t>Monday, April 12, 2021</a:t>
             </a:fld>
             <a:endParaRPr lang="en-US"/>
           </a:p>
@@ -2197,7 +2197,7 @@
           <a:p>
             <a:fld id="{6FE8C025-CD7A-4966-867E-81CF82B15267}" type="datetime2">
               <a:rPr lang="en-US" smtClean="0"/>
-              <a:t>Friday, April 9, 2021</a:t>
+              <a:t>Monday, April 12, 2021</a:t>
             </a:fld>
             <a:endParaRPr lang="en-US"/>
           </a:p>
@@ -2817,7 +2817,7 @@
           <a:p>
             <a:fld id="{FE809929-0719-4517-94D6-FDF7F99E70F6}" type="datetime2">
               <a:rPr lang="en-US" smtClean="0"/>
-              <a:t>Friday, April 9, 2021</a:t>
+              <a:t>Monday, April 12, 2021</a:t>
             </a:fld>
             <a:endParaRPr lang="en-US"/>
           </a:p>
@@ -3935,7 +3935,7 @@
           <a:p>
             <a:fld id="{20E95673-5512-4AAA-9AEB-E00C61EC65D5}" type="datetime2">
               <a:rPr lang="en-US" smtClean="0"/>
-              <a:t>Friday, April 9, 2021</a:t>
+              <a:t>Monday, April 12, 2021</a:t>
             </a:fld>
             <a:endParaRPr lang="en-US"/>
           </a:p>
@@ -4482,7 +4482,7 @@
           <a:p>
             <a:fld id="{C13138FA-2E87-4873-8BBA-13E447C9A99A}" type="datetime2">
               <a:rPr lang="en-US" smtClean="0"/>
-              <a:t>Friday, April 9, 2021</a:t>
+              <a:t>Monday, April 12, 2021</a:t>
             </a:fld>
             <a:endParaRPr lang="en-US"/>
           </a:p>
@@ -4643,7 +4643,7 @@
           <a:p>
             <a:fld id="{D75BB40A-97BD-4BFB-B639-0BFF95FDE8B7}" type="datetime2">
               <a:rPr lang="en-US" smtClean="0"/>
-              <a:t>Friday, April 9, 2021</a:t>
+              <a:t>Monday, April 12, 2021</a:t>
             </a:fld>
             <a:endParaRPr lang="en-US"/>
           </a:p>
@@ -5678,7 +5678,7 @@
           <a:p>
             <a:fld id="{9EE9E0E3-ECF6-4CFE-8698-AEFEBCECC3C0}" type="datetime2">
               <a:rPr lang="en-US" smtClean="0"/>
-              <a:t>Friday, April 9, 2021</a:t>
+              <a:t>Monday, April 12, 2021</a:t>
             </a:fld>
             <a:endParaRPr lang="en-US"/>
           </a:p>
@@ -6324,7 +6324,7 @@
           <a:p>
             <a:fld id="{251462FC-960E-4740-921F-B36862979F21}" type="datetime2">
               <a:rPr lang="en-US" smtClean="0"/>
-              <a:t>Friday, April 9, 2021</a:t>
+              <a:t>Monday, April 12, 2021</a:t>
             </a:fld>
             <a:endParaRPr lang="en-US"/>
           </a:p>
@@ -7088,7 +7088,7 @@
           <a:p>
             <a:fld id="{E50BC9E2-CB44-4C05-9BB5-496C18A241E0}" type="datetime2">
               <a:rPr lang="en-US" smtClean="0"/>
-              <a:t>Friday, April 9, 2021</a:t>
+              <a:t>Monday, April 12, 2021</a:t>
             </a:fld>
             <a:endParaRPr lang="en-US"/>
           </a:p>
@@ -7341,7 +7341,7 @@
           <a:p>
             <a:fld id="{246CB39B-5F4C-4A7E-9BE3-AAFD45576D16}" type="datetime2">
               <a:rPr lang="en-US" smtClean="0"/>
-              <a:t>Friday, April 9, 2021</a:t>
+              <a:t>Monday, April 12, 2021</a:t>
             </a:fld>
             <a:endParaRPr lang="en-US" dirty="0"/>
           </a:p>
@@ -8989,6 +8989,194 @@
           <p:cNvPr id="2" name="Title 1">
             <a:extLst>
               <a:ext uri="{FF2B5EF4-FFF2-40B4-BE49-F238E27FC236}">
+                <a16:creationId xmlns:a16="http://schemas.microsoft.com/office/drawing/2014/main" id="{25F43622-0893-4FE5-BDB9-E673525B7C5A}"/>
+              </a:ext>
+            </a:extLst>
+          </p:cNvPr>
+          <p:cNvSpPr>
+            <a:spLocks noGrp="1"/>
+          </p:cNvSpPr>
+          <p:nvPr>
+            <p:ph type="title"/>
+          </p:nvPr>
+        </p:nvSpPr>
+        <p:spPr/>
+        <p:txBody>
+          <a:bodyPr/>
+          <a:lstStyle/>
+          <a:p>
+            <a:r>
+              <a:rPr lang="en-US" dirty="0"/>
+              <a:t>GitHub Vocab</a:t>
+            </a:r>
+          </a:p>
+        </p:txBody>
+      </p:sp>
+      <p:sp>
+        <p:nvSpPr>
+          <p:cNvPr id="3" name="Content Placeholder 2">
+            <a:extLst>
+              <a:ext uri="{FF2B5EF4-FFF2-40B4-BE49-F238E27FC236}">
+                <a16:creationId xmlns:a16="http://schemas.microsoft.com/office/drawing/2014/main" id="{A8851EAD-3E48-4187-B9B1-CE8066E4E519}"/>
+              </a:ext>
+            </a:extLst>
+          </p:cNvPr>
+          <p:cNvSpPr>
+            <a:spLocks noGrp="1"/>
+          </p:cNvSpPr>
+          <p:nvPr>
+            <p:ph idx="1"/>
+          </p:nvPr>
+        </p:nvSpPr>
+        <p:spPr>
+          <a:xfrm>
+            <a:off x="1630516" y="1958964"/>
+            <a:ext cx="7568568" cy="2701172"/>
+          </a:xfrm>
+        </p:spPr>
+        <p:txBody>
+          <a:bodyPr numCol="2">
+            <a:normAutofit/>
+          </a:bodyPr>
+          <a:lstStyle/>
+          <a:p>
+            <a:r>
+              <a:rPr lang="en-US" dirty="0"/>
+              <a:t>Repository </a:t>
+            </a:r>
+          </a:p>
+          <a:p>
+            <a:r>
+              <a:rPr lang="en-US" dirty="0"/>
+              <a:t>Directory</a:t>
+            </a:r>
+          </a:p>
+          <a:p>
+            <a:r>
+              <a:rPr lang="en-US" dirty="0"/>
+              <a:t>Clone</a:t>
+            </a:r>
+          </a:p>
+          <a:p>
+            <a:pPr marL="0" indent="0">
+              <a:buNone/>
+            </a:pPr>
+            <a:r>
+              <a:rPr lang="en-US" dirty="0"/>
+              <a:t>                    &amp; much more…</a:t>
+            </a:r>
+          </a:p>
+          <a:p>
+            <a:r>
+              <a:rPr lang="en-US" dirty="0"/>
+              <a:t>Commit</a:t>
+            </a:r>
+          </a:p>
+          <a:p>
+            <a:r>
+              <a:rPr lang="en-US" dirty="0"/>
+              <a:t>Push</a:t>
+            </a:r>
+          </a:p>
+          <a:p>
+            <a:r>
+              <a:rPr lang="en-US" dirty="0"/>
+              <a:t>Pulls</a:t>
+            </a:r>
+          </a:p>
+        </p:txBody>
+      </p:sp>
+      <p:pic>
+        <p:nvPicPr>
+          <p:cNvPr id="5" name="Picture 2" descr="GitHub Logos and Usage · GitHub">
+            <a:extLst>
+              <a:ext uri="{FF2B5EF4-FFF2-40B4-BE49-F238E27FC236}">
+                <a16:creationId xmlns:a16="http://schemas.microsoft.com/office/drawing/2014/main" id="{D6918636-AF32-4CB9-BADA-B8E0E6257FF3}"/>
+              </a:ext>
+            </a:extLst>
+          </p:cNvPr>
+          <p:cNvPicPr>
+            <a:picLocks noChangeAspect="1" noChangeArrowheads="1"/>
+          </p:cNvPicPr>
+          <p:nvPr/>
+        </p:nvPicPr>
+        <p:blipFill>
+          <a:blip r:embed="rId2">
+            <a:extLst>
+              <a:ext uri="{BEBA8EAE-BF5A-486C-A8C5-ECC9F3942E4B}">
+                <a14:imgProps xmlns:a14="http://schemas.microsoft.com/office/drawing/2010/main">
+                  <a14:imgLayer r:embed="rId3">
+                    <a14:imgEffect>
+                      <a14:backgroundRemoval t="10000" b="90000" l="10000" r="90000"/>
+                    </a14:imgEffect>
+                  </a14:imgLayer>
+                </a14:imgProps>
+              </a:ext>
+              <a:ext uri="{28A0092B-C50C-407E-A947-70E740481C1C}">
+                <a14:useLocalDpi xmlns:a14="http://schemas.microsoft.com/office/drawing/2010/main" val="0"/>
+              </a:ext>
+            </a:extLst>
+          </a:blip>
+          <a:srcRect/>
+          <a:stretch>
+            <a:fillRect/>
+          </a:stretch>
+        </p:blipFill>
+        <p:spPr bwMode="auto">
+          <a:xfrm>
+            <a:off x="8747393" y="3588795"/>
+            <a:ext cx="3028883" cy="3028883"/>
+          </a:xfrm>
+          <a:prstGeom prst="rect">
+            <a:avLst/>
+          </a:prstGeom>
+          <a:noFill/>
+          <a:extLst>
+            <a:ext uri="{909E8E84-426E-40DD-AFC4-6F175D3DCCD1}">
+              <a14:hiddenFill xmlns:a14="http://schemas.microsoft.com/office/drawing/2010/main">
+                <a:solidFill>
+                  <a:srgbClr val="FFFFFF"/>
+                </a:solidFill>
+              </a14:hiddenFill>
+            </a:ext>
+          </a:extLst>
+        </p:spPr>
+      </p:pic>
+    </p:spTree>
+    <p:extLst>
+      <p:ext uri="{BB962C8B-B14F-4D97-AF65-F5344CB8AC3E}">
+        <p14:creationId xmlns:p14="http://schemas.microsoft.com/office/powerpoint/2010/main" val="2296288828"/>
+      </p:ext>
+    </p:extLst>
+  </p:cSld>
+  <p:clrMapOvr>
+    <a:masterClrMapping/>
+  </p:clrMapOvr>
+</p:sld>
+</file>
+
+<file path=ppt/slides/slide4.xml><?xml version="1.0" encoding="utf-8"?>
+<p:sld xmlns:a="http://schemas.openxmlformats.org/drawingml/2006/main" xmlns:r="http://schemas.openxmlformats.org/officeDocument/2006/relationships" xmlns:p="http://schemas.openxmlformats.org/presentationml/2006/main">
+  <p:cSld>
+    <p:spTree>
+      <p:nvGrpSpPr>
+        <p:cNvPr id="1" name=""/>
+        <p:cNvGrpSpPr/>
+        <p:nvPr/>
+      </p:nvGrpSpPr>
+      <p:grpSpPr>
+        <a:xfrm>
+          <a:off x="0" y="0"/>
+          <a:ext cx="0" cy="0"/>
+          <a:chOff x="0" y="0"/>
+          <a:chExt cx="0" cy="0"/>
+        </a:xfrm>
+      </p:grpSpPr>
+      <p:sp>
+        <p:nvSpPr>
+          <p:cNvPr id="2" name="Title 1">
+            <a:extLst>
+              <a:ext uri="{FF2B5EF4-FFF2-40B4-BE49-F238E27FC236}">
                 <a16:creationId xmlns:a16="http://schemas.microsoft.com/office/drawing/2014/main" id="{2D006E6D-3D8F-4B22-9840-740B425C0CDF}"/>
               </a:ext>
             </a:extLst>
@@ -9339,12 +9527,6 @@
           <a:p>
             <a:r>
               <a:rPr lang="en-US" dirty="0"/>
-              <a:t>Easy navigation around trees</a:t>
-            </a:r>
-          </a:p>
-          <a:p>
-            <a:r>
-              <a:rPr lang="en-US" dirty="0"/>
               <a:t>GUI is quite good</a:t>
             </a:r>
           </a:p>
@@ -9422,344 +9604,6 @@
   <p:clrMapOvr>
     <a:masterClrMapping/>
   </p:clrMapOvr>
-  <p:timing>
-    <p:tnLst>
-      <p:par>
-        <p:cTn id="1" dur="indefinite" restart="never" nodeType="tmRoot">
-          <p:childTnLst>
-            <p:seq concurrent="1" nextAc="seek">
-              <p:cTn id="2" dur="indefinite" nodeType="mainSeq">
-                <p:childTnLst>
-                  <p:par>
-                    <p:cTn id="3" fill="hold">
-                      <p:stCondLst>
-                        <p:cond delay="indefinite"/>
-                      </p:stCondLst>
-                      <p:childTnLst>
-                        <p:par>
-                          <p:cTn id="4" fill="hold">
-                            <p:stCondLst>
-                              <p:cond delay="0"/>
-                            </p:stCondLst>
-                            <p:childTnLst>
-                              <p:par>
-                                <p:cTn id="5" presetID="1" presetClass="exit" presetSubtype="0" fill="hold" nodeType="clickEffect">
-                                  <p:stCondLst>
-                                    <p:cond delay="0"/>
-                                  </p:stCondLst>
-                                  <p:childTnLst>
-                                    <p:set>
-                                      <p:cBhvr>
-                                        <p:cTn id="6" dur="1" fill="hold">
-                                          <p:stCondLst>
-                                            <p:cond delay="0"/>
-                                          </p:stCondLst>
-                                        </p:cTn>
-                                        <p:tgtEl>
-                                          <p:spTgt spid="6"/>
-                                        </p:tgtEl>
-                                        <p:attrNameLst>
-                                          <p:attrName>style.visibility</p:attrName>
-                                        </p:attrNameLst>
-                                      </p:cBhvr>
-                                      <p:to>
-                                        <p:strVal val="hidden"/>
-                                      </p:to>
-                                    </p:set>
-                                  </p:childTnLst>
-                                </p:cTn>
-                              </p:par>
-                            </p:childTnLst>
-                          </p:cTn>
-                        </p:par>
-                      </p:childTnLst>
-                    </p:cTn>
-                  </p:par>
-                </p:childTnLst>
-              </p:cTn>
-              <p:prevCondLst>
-                <p:cond evt="onPrev" delay="0">
-                  <p:tgtEl>
-                    <p:sldTgt/>
-                  </p:tgtEl>
-                </p:cond>
-              </p:prevCondLst>
-              <p:nextCondLst>
-                <p:cond evt="onNext" delay="0">
-                  <p:tgtEl>
-                    <p:sldTgt/>
-                  </p:tgtEl>
-                </p:cond>
-              </p:nextCondLst>
-            </p:seq>
-          </p:childTnLst>
-        </p:cTn>
-      </p:par>
-    </p:tnLst>
-  </p:timing>
-</p:sld>
-</file>
-
-<file path=ppt/slides/slide4.xml><?xml version="1.0" encoding="utf-8"?>
-<p:sld xmlns:a="http://schemas.openxmlformats.org/drawingml/2006/main" xmlns:r="http://schemas.openxmlformats.org/officeDocument/2006/relationships" xmlns:p="http://schemas.openxmlformats.org/presentationml/2006/main">
-  <p:cSld>
-    <p:spTree>
-      <p:nvGrpSpPr>
-        <p:cNvPr id="1" name=""/>
-        <p:cNvGrpSpPr/>
-        <p:nvPr/>
-      </p:nvGrpSpPr>
-      <p:grpSpPr>
-        <a:xfrm>
-          <a:off x="0" y="0"/>
-          <a:ext cx="0" cy="0"/>
-          <a:chOff x="0" y="0"/>
-          <a:chExt cx="0" cy="0"/>
-        </a:xfrm>
-      </p:grpSpPr>
-      <p:sp>
-        <p:nvSpPr>
-          <p:cNvPr id="2" name="Title 1">
-            <a:extLst>
-              <a:ext uri="{FF2B5EF4-FFF2-40B4-BE49-F238E27FC236}">
-                <a16:creationId xmlns:a16="http://schemas.microsoft.com/office/drawing/2014/main" id="{25F43622-0893-4FE5-BDB9-E673525B7C5A}"/>
-              </a:ext>
-            </a:extLst>
-          </p:cNvPr>
-          <p:cNvSpPr>
-            <a:spLocks noGrp="1"/>
-          </p:cNvSpPr>
-          <p:nvPr>
-            <p:ph type="title"/>
-          </p:nvPr>
-        </p:nvSpPr>
-        <p:spPr/>
-        <p:txBody>
-          <a:bodyPr/>
-          <a:lstStyle/>
-          <a:p>
-            <a:r>
-              <a:rPr lang="en-US" dirty="0"/>
-              <a:t>GitHub Vocab</a:t>
-            </a:r>
-          </a:p>
-        </p:txBody>
-      </p:sp>
-      <p:sp>
-        <p:nvSpPr>
-          <p:cNvPr id="3" name="Content Placeholder 2">
-            <a:extLst>
-              <a:ext uri="{FF2B5EF4-FFF2-40B4-BE49-F238E27FC236}">
-                <a16:creationId xmlns:a16="http://schemas.microsoft.com/office/drawing/2014/main" id="{A8851EAD-3E48-4187-B9B1-CE8066E4E519}"/>
-              </a:ext>
-            </a:extLst>
-          </p:cNvPr>
-          <p:cNvSpPr>
-            <a:spLocks noGrp="1"/>
-          </p:cNvSpPr>
-          <p:nvPr>
-            <p:ph idx="1"/>
-          </p:nvPr>
-        </p:nvSpPr>
-        <p:spPr>
-          <a:xfrm>
-            <a:off x="1630516" y="1958964"/>
-            <a:ext cx="7568568" cy="2701172"/>
-          </a:xfrm>
-        </p:spPr>
-        <p:txBody>
-          <a:bodyPr numCol="2">
-            <a:normAutofit/>
-          </a:bodyPr>
-          <a:lstStyle/>
-          <a:p>
-            <a:r>
-              <a:rPr lang="en-US" dirty="0"/>
-              <a:t>Directory</a:t>
-            </a:r>
-          </a:p>
-          <a:p>
-            <a:r>
-              <a:rPr lang="en-US" dirty="0"/>
-              <a:t>Repository</a:t>
-            </a:r>
-          </a:p>
-          <a:p>
-            <a:r>
-              <a:rPr lang="en-US" dirty="0"/>
-              <a:t>Clone</a:t>
-            </a:r>
-          </a:p>
-          <a:p>
-            <a:pPr marL="0" indent="0">
-              <a:buNone/>
-            </a:pPr>
-            <a:r>
-              <a:rPr lang="en-US" dirty="0"/>
-              <a:t>&amp; much more…</a:t>
-            </a:r>
-          </a:p>
-          <a:p>
-            <a:r>
-              <a:rPr lang="en-US" dirty="0"/>
-              <a:t>Commit</a:t>
-            </a:r>
-          </a:p>
-          <a:p>
-            <a:r>
-              <a:rPr lang="en-US" dirty="0"/>
-              <a:t>Push</a:t>
-            </a:r>
-          </a:p>
-          <a:p>
-            <a:r>
-              <a:rPr lang="en-US" dirty="0"/>
-              <a:t>Pulls</a:t>
-            </a:r>
-          </a:p>
-        </p:txBody>
-      </p:sp>
-      <p:pic>
-        <p:nvPicPr>
-          <p:cNvPr id="5" name="Picture 2" descr="GitHub Logos and Usage · GitHub">
-            <a:extLst>
-              <a:ext uri="{FF2B5EF4-FFF2-40B4-BE49-F238E27FC236}">
-                <a16:creationId xmlns:a16="http://schemas.microsoft.com/office/drawing/2014/main" id="{D6918636-AF32-4CB9-BADA-B8E0E6257FF3}"/>
-              </a:ext>
-            </a:extLst>
-          </p:cNvPr>
-          <p:cNvPicPr>
-            <a:picLocks noChangeAspect="1" noChangeArrowheads="1"/>
-          </p:cNvPicPr>
-          <p:nvPr/>
-        </p:nvPicPr>
-        <p:blipFill>
-          <a:blip r:embed="rId2">
-            <a:extLst>
-              <a:ext uri="{BEBA8EAE-BF5A-486C-A8C5-ECC9F3942E4B}">
-                <a14:imgProps xmlns:a14="http://schemas.microsoft.com/office/drawing/2010/main">
-                  <a14:imgLayer r:embed="rId3">
-                    <a14:imgEffect>
-                      <a14:backgroundRemoval t="10000" b="90000" l="10000" r="90000"/>
-                    </a14:imgEffect>
-                  </a14:imgLayer>
-                </a14:imgProps>
-              </a:ext>
-              <a:ext uri="{28A0092B-C50C-407E-A947-70E740481C1C}">
-                <a14:useLocalDpi xmlns:a14="http://schemas.microsoft.com/office/drawing/2010/main" val="0"/>
-              </a:ext>
-            </a:extLst>
-          </a:blip>
-          <a:srcRect/>
-          <a:stretch>
-            <a:fillRect/>
-          </a:stretch>
-        </p:blipFill>
-        <p:spPr bwMode="auto">
-          <a:xfrm>
-            <a:off x="8747393" y="3588795"/>
-            <a:ext cx="3028883" cy="3028883"/>
-          </a:xfrm>
-          <a:prstGeom prst="rect">
-            <a:avLst/>
-          </a:prstGeom>
-          <a:noFill/>
-          <a:extLst>
-            <a:ext uri="{909E8E84-426E-40DD-AFC4-6F175D3DCCD1}">
-              <a14:hiddenFill xmlns:a14="http://schemas.microsoft.com/office/drawing/2010/main">
-                <a:solidFill>
-                  <a:srgbClr val="FFFFFF"/>
-                </a:solidFill>
-              </a14:hiddenFill>
-            </a:ext>
-          </a:extLst>
-        </p:spPr>
-      </p:pic>
-    </p:spTree>
-    <p:extLst>
-      <p:ext uri="{BB962C8B-B14F-4D97-AF65-F5344CB8AC3E}">
-        <p14:creationId xmlns:p14="http://schemas.microsoft.com/office/powerpoint/2010/main" val="2296288828"/>
-      </p:ext>
-    </p:extLst>
-  </p:cSld>
-  <p:clrMapOvr>
-    <a:masterClrMapping/>
-  </p:clrMapOvr>
-  <p:timing>
-    <p:tnLst>
-      <p:par>
-        <p:cTn id="1" dur="indefinite" restart="never" nodeType="tmRoot">
-          <p:childTnLst>
-            <p:seq concurrent="1" nextAc="seek">
-              <p:cTn id="2" dur="indefinite" nodeType="mainSeq">
-                <p:childTnLst>
-                  <p:par>
-                    <p:cTn id="3" fill="hold">
-                      <p:stCondLst>
-                        <p:cond delay="indefinite"/>
-                      </p:stCondLst>
-                      <p:childTnLst>
-                        <p:par>
-                          <p:cTn id="4" fill="hold">
-                            <p:stCondLst>
-                              <p:cond delay="0"/>
-                            </p:stCondLst>
-                            <p:childTnLst>
-                              <p:par>
-                                <p:cTn id="5" presetID="1" presetClass="exit" presetSubtype="0" fill="hold" nodeType="clickEffect">
-                                  <p:stCondLst>
-                                    <p:cond delay="0"/>
-                                  </p:stCondLst>
-                                  <p:childTnLst>
-                                    <p:set>
-                                      <p:cBhvr>
-                                        <p:cTn id="6" dur="1" fill="hold">
-                                          <p:stCondLst>
-                                            <p:cond delay="0"/>
-                                          </p:stCondLst>
-                                        </p:cTn>
-                                        <p:tgtEl>
-                                          <p:spTgt spid="5"/>
-                                        </p:tgtEl>
-                                        <p:attrNameLst>
-                                          <p:attrName>style.visibility</p:attrName>
-                                        </p:attrNameLst>
-                                      </p:cBhvr>
-                                      <p:to>
-                                        <p:strVal val="hidden"/>
-                                      </p:to>
-                                    </p:set>
-                                  </p:childTnLst>
-                                </p:cTn>
-                              </p:par>
-                            </p:childTnLst>
-                          </p:cTn>
-                        </p:par>
-                      </p:childTnLst>
-                    </p:cTn>
-                  </p:par>
-                </p:childTnLst>
-              </p:cTn>
-              <p:prevCondLst>
-                <p:cond evt="onPrev" delay="0">
-                  <p:tgtEl>
-                    <p:sldTgt/>
-                  </p:tgtEl>
-                </p:cond>
-              </p:prevCondLst>
-              <p:nextCondLst>
-                <p:cond evt="onNext" delay="0">
-                  <p:tgtEl>
-                    <p:sldTgt/>
-                  </p:tgtEl>
-                </p:cond>
-              </p:nextCondLst>
-            </p:seq>
-          </p:childTnLst>
-        </p:cTn>
-      </p:par>
-    </p:tnLst>
-  </p:timing>
 </p:sld>
 </file>
 
@@ -9919,81 +9763,6 @@
   <p:clrMapOvr>
     <a:masterClrMapping/>
   </p:clrMapOvr>
-  <p:timing>
-    <p:tnLst>
-      <p:par>
-        <p:cTn id="1" dur="indefinite" restart="never" nodeType="tmRoot">
-          <p:childTnLst>
-            <p:seq concurrent="1" nextAc="seek">
-              <p:cTn id="2" dur="indefinite" nodeType="mainSeq">
-                <p:childTnLst>
-                  <p:par>
-                    <p:cTn id="3" fill="hold">
-                      <p:stCondLst>
-                        <p:cond delay="indefinite"/>
-                      </p:stCondLst>
-                      <p:childTnLst>
-                        <p:par>
-                          <p:cTn id="4" fill="hold">
-                            <p:stCondLst>
-                              <p:cond delay="0"/>
-                            </p:stCondLst>
-                            <p:childTnLst>
-                              <p:par>
-                                <p:cTn id="5" presetID="1" presetClass="exit" presetSubtype="0" fill="hold" nodeType="clickEffect">
-                                  <p:stCondLst>
-                                    <p:cond delay="0"/>
-                                  </p:stCondLst>
-                                  <p:childTnLst>
-                                    <p:set>
-                                      <p:cBhvr>
-                                        <p:cTn id="6" dur="1" fill="hold">
-                                          <p:stCondLst>
-                                            <p:cond delay="0"/>
-                                          </p:stCondLst>
-                                        </p:cTn>
-                                        <p:tgtEl>
-                                          <p:spTgt spid="4"/>
-                                        </p:tgtEl>
-                                        <p:attrNameLst>
-                                          <p:attrName>style.visibility</p:attrName>
-                                        </p:attrNameLst>
-                                      </p:cBhvr>
-                                      <p:to>
-                                        <p:strVal val="hidden"/>
-                                      </p:to>
-                                    </p:set>
-                                  </p:childTnLst>
-                                </p:cTn>
-                              </p:par>
-                            </p:childTnLst>
-                          </p:cTn>
-                        </p:par>
-                      </p:childTnLst>
-                    </p:cTn>
-                  </p:par>
-                </p:childTnLst>
-              </p:cTn>
-              <p:prevCondLst>
-                <p:cond evt="onPrev" delay="0">
-                  <p:tgtEl>
-                    <p:sldTgt/>
-                  </p:tgtEl>
-                </p:cond>
-              </p:prevCondLst>
-              <p:nextCondLst>
-                <p:cond evt="onNext" delay="0">
-                  <p:tgtEl>
-                    <p:sldTgt/>
-                  </p:tgtEl>
-                </p:cond>
-              </p:nextCondLst>
-            </p:seq>
-          </p:childTnLst>
-        </p:cTn>
-      </p:par>
-    </p:tnLst>
-  </p:timing>
 </p:sld>
 </file>
 
@@ -10060,7 +9829,7 @@
         </p:nvSpPr>
         <p:spPr>
           <a:xfrm>
-            <a:off x="1565980" y="1881275"/>
+            <a:off x="1416894" y="1881275"/>
             <a:ext cx="7667473" cy="3979625"/>
           </a:xfrm>
         </p:spPr>
@@ -10386,9 +10155,16 @@
             <p:ph idx="1"/>
           </p:nvPr>
         </p:nvSpPr>
-        <p:spPr/>
+        <p:spPr>
+          <a:xfrm>
+            <a:off x="660194" y="1606303"/>
+            <a:ext cx="11090274" cy="3979625"/>
+          </a:xfrm>
+        </p:spPr>
         <p:txBody>
-          <a:bodyPr/>
+          <a:bodyPr>
+            <a:normAutofit/>
+          </a:bodyPr>
           <a:lstStyle/>
           <a:p>
             <a:r>
@@ -10412,6 +10188,19 @@
             <a:r>
               <a:rPr lang="en-US" dirty="0"/>
               <a:t>Generally renders well on GitHub</a:t>
+            </a:r>
+          </a:p>
+          <a:p>
+            <a:r>
+              <a:rPr lang="en-US" dirty="0"/>
+              <a:t>Cons:</a:t>
+            </a:r>
+          </a:p>
+          <a:p>
+            <a:pPr lvl="1"/>
+            <a:r>
+              <a:rPr lang="en-US" dirty="0"/>
+              <a:t>Need to remember to save</a:t>
             </a:r>
           </a:p>
           <a:p>
@@ -10494,7 +10283,7 @@
         </p:blipFill>
         <p:spPr bwMode="auto">
           <a:xfrm>
-            <a:off x="2019038" y="2281663"/>
+            <a:off x="2088612" y="1790039"/>
             <a:ext cx="1001775" cy="525932"/>
           </a:xfrm>
           <a:prstGeom prst="rect">
@@ -10838,15 +10627,7 @@
               <a:rPr lang="en-US" dirty="0">
                 <a:hlinkClick r:id="rId2"/>
               </a:rPr>
-              <a:t>https://docs.github.com/en/github/getting-started-with-github</a:t>
-            </a:r>
-          </a:p>
-          <a:p>
-            <a:r>
-              <a:rPr lang="en-US" dirty="0">
-                <a:hlinkClick r:id="rId2"/>
-              </a:rPr>
-              <a:t>https://github.com/jupyter/jupyter/wiki/A-gallery-of-interesting-Jupyter-Notebooks</a:t>
+              <a:t>Getting started with GitHub</a:t>
             </a:r>
             <a:endParaRPr lang="en-US" dirty="0"/>
           </a:p>
@@ -10854,6 +10635,47 @@
             <a:r>
               <a:rPr lang="en-US" dirty="0">
                 <a:hlinkClick r:id="rId3"/>
+              </a:rPr>
+              <a:t>Getting started with Git</a:t>
+            </a:r>
+            <a:endParaRPr lang="en-US" dirty="0"/>
+          </a:p>
+          <a:p>
+            <a:r>
+              <a:rPr lang="en-US" dirty="0">
+                <a:hlinkClick r:id="rId4"/>
+              </a:rPr>
+              <a:t>Installing Anaconda</a:t>
+            </a:r>
+            <a:endParaRPr lang="en-US" dirty="0">
+              <a:hlinkClick r:id="rId5"/>
+            </a:endParaRPr>
+          </a:p>
+          <a:p>
+            <a:r>
+              <a:rPr lang="en-US" dirty="0">
+                <a:hlinkClick r:id="rId5"/>
+              </a:rPr>
+              <a:t>A Gallery Of </a:t>
+            </a:r>
+            <a:r>
+              <a:rPr lang="en-US" dirty="0" err="1">
+                <a:hlinkClick r:id="rId5"/>
+              </a:rPr>
+              <a:t>Jupyter</a:t>
+            </a:r>
+            <a:r>
+              <a:rPr lang="en-US" dirty="0">
+                <a:hlinkClick r:id="rId5"/>
+              </a:rPr>
+              <a:t> Notebooks</a:t>
+            </a:r>
+            <a:endParaRPr lang="en-US" dirty="0"/>
+          </a:p>
+          <a:p>
+            <a:r>
+              <a:rPr lang="en-US" dirty="0">
+                <a:hlinkClick r:id="rId6"/>
               </a:rPr>
               <a:t>https://github.com/JoanneStasiak/JupyterNotebook</a:t>
             </a:r>

</xml_diff>

<commit_message>
updated dog notebook with bokeh backend
</commit_message>
<xml_diff>
--- a/Github and jupyter.pptx
+++ b/Github and jupyter.pptx
@@ -285,7 +285,7 @@
           <a:p>
             <a:fld id="{72EA7947-E287-4738-8C82-07CE4F01EF03}" type="datetime2">
               <a:rPr lang="en-US" smtClean="0"/>
-              <a:t>Monday, April 12, 2021</a:t>
+              <a:t>Wednesday, April 14, 2021</a:t>
             </a:fld>
             <a:endParaRPr lang="en-US" dirty="0"/>
           </a:p>
@@ -1321,7 +1321,7 @@
           <a:p>
             <a:fld id="{EE2EBD84-71F4-4271-8C46-0D47C0A9B12E}" type="datetime2">
               <a:rPr lang="en-US" smtClean="0"/>
-              <a:t>Monday, April 12, 2021</a:t>
+              <a:t>Wednesday, April 14, 2021</a:t>
             </a:fld>
             <a:endParaRPr lang="en-US"/>
           </a:p>
@@ -1532,7 +1532,7 @@
           <a:p>
             <a:fld id="{ABAE0CE1-F450-4107-B2CB-17B18F8A3F4A}" type="datetime2">
               <a:rPr lang="en-US" smtClean="0"/>
-              <a:t>Monday, April 12, 2021</a:t>
+              <a:t>Wednesday, April 14, 2021</a:t>
             </a:fld>
             <a:endParaRPr lang="en-US"/>
           </a:p>
@@ -2197,7 +2197,7 @@
           <a:p>
             <a:fld id="{6FE8C025-CD7A-4966-867E-81CF82B15267}" type="datetime2">
               <a:rPr lang="en-US" smtClean="0"/>
-              <a:t>Monday, April 12, 2021</a:t>
+              <a:t>Wednesday, April 14, 2021</a:t>
             </a:fld>
             <a:endParaRPr lang="en-US"/>
           </a:p>
@@ -2817,7 +2817,7 @@
           <a:p>
             <a:fld id="{FE809929-0719-4517-94D6-FDF7F99E70F6}" type="datetime2">
               <a:rPr lang="en-US" smtClean="0"/>
-              <a:t>Monday, April 12, 2021</a:t>
+              <a:t>Wednesday, April 14, 2021</a:t>
             </a:fld>
             <a:endParaRPr lang="en-US"/>
           </a:p>
@@ -3935,7 +3935,7 @@
           <a:p>
             <a:fld id="{20E95673-5512-4AAA-9AEB-E00C61EC65D5}" type="datetime2">
               <a:rPr lang="en-US" smtClean="0"/>
-              <a:t>Monday, April 12, 2021</a:t>
+              <a:t>Wednesday, April 14, 2021</a:t>
             </a:fld>
             <a:endParaRPr lang="en-US"/>
           </a:p>
@@ -4482,7 +4482,7 @@
           <a:p>
             <a:fld id="{C13138FA-2E87-4873-8BBA-13E447C9A99A}" type="datetime2">
               <a:rPr lang="en-US" smtClean="0"/>
-              <a:t>Monday, April 12, 2021</a:t>
+              <a:t>Wednesday, April 14, 2021</a:t>
             </a:fld>
             <a:endParaRPr lang="en-US"/>
           </a:p>
@@ -4643,7 +4643,7 @@
           <a:p>
             <a:fld id="{D75BB40A-97BD-4BFB-B639-0BFF95FDE8B7}" type="datetime2">
               <a:rPr lang="en-US" smtClean="0"/>
-              <a:t>Monday, April 12, 2021</a:t>
+              <a:t>Wednesday, April 14, 2021</a:t>
             </a:fld>
             <a:endParaRPr lang="en-US"/>
           </a:p>
@@ -5678,7 +5678,7 @@
           <a:p>
             <a:fld id="{9EE9E0E3-ECF6-4CFE-8698-AEFEBCECC3C0}" type="datetime2">
               <a:rPr lang="en-US" smtClean="0"/>
-              <a:t>Monday, April 12, 2021</a:t>
+              <a:t>Wednesday, April 14, 2021</a:t>
             </a:fld>
             <a:endParaRPr lang="en-US"/>
           </a:p>
@@ -6324,7 +6324,7 @@
           <a:p>
             <a:fld id="{251462FC-960E-4740-921F-B36862979F21}" type="datetime2">
               <a:rPr lang="en-US" smtClean="0"/>
-              <a:t>Monday, April 12, 2021</a:t>
+              <a:t>Wednesday, April 14, 2021</a:t>
             </a:fld>
             <a:endParaRPr lang="en-US"/>
           </a:p>
@@ -7088,7 +7088,7 @@
           <a:p>
             <a:fld id="{E50BC9E2-CB44-4C05-9BB5-496C18A241E0}" type="datetime2">
               <a:rPr lang="en-US" smtClean="0"/>
-              <a:t>Monday, April 12, 2021</a:t>
+              <a:t>Wednesday, April 14, 2021</a:t>
             </a:fld>
             <a:endParaRPr lang="en-US"/>
           </a:p>
@@ -7341,7 +7341,7 @@
           <a:p>
             <a:fld id="{246CB39B-5F4C-4A7E-9BE3-AAFD45576D16}" type="datetime2">
               <a:rPr lang="en-US" smtClean="0"/>
-              <a:t>Monday, April 12, 2021</a:t>
+              <a:t>Wednesday, April 14, 2021</a:t>
             </a:fld>
             <a:endParaRPr lang="en-US" dirty="0"/>
           </a:p>
@@ -8563,7 +8563,15 @@
             <p:ph type="title"/>
           </p:nvPr>
         </p:nvSpPr>
-        <p:spPr/>
+        <p:spPr>
+          <a:xfrm>
+            <a:off x="549537" y="535543"/>
+            <a:ext cx="11091600" cy="1332000"/>
+          </a:xfrm>
+          <a:solidFill>
+            <a:srgbClr val="3E3423"/>
+          </a:solidFill>
+        </p:spPr>
         <p:txBody>
           <a:bodyPr>
             <a:normAutofit/>
@@ -8601,6 +8609,236 @@
             <a:r>
               <a:rPr lang="en-US" dirty="0"/>
               <a:t>Website that uses Git to track changes in code</a:t>
+            </a:r>
+          </a:p>
+          <a:p>
+            <a:endParaRPr lang="en-US" dirty="0"/>
+          </a:p>
+        </p:txBody>
+      </p:sp>
+      <p:sp>
+        <p:nvSpPr>
+          <p:cNvPr id="11" name="Content Placeholder 2">
+            <a:extLst>
+              <a:ext uri="{FF2B5EF4-FFF2-40B4-BE49-F238E27FC236}">
+                <a16:creationId xmlns:a16="http://schemas.microsoft.com/office/drawing/2014/main" id="{5A84602E-52F9-48B3-BEA4-47AAE9D24EB2}"/>
+              </a:ext>
+            </a:extLst>
+          </p:cNvPr>
+          <p:cNvSpPr txBox="1">
+            <a:spLocks/>
+          </p:cNvSpPr>
+          <p:nvPr/>
+        </p:nvSpPr>
+        <p:spPr>
+          <a:xfrm>
+            <a:off x="550863" y="2126660"/>
+            <a:ext cx="11090274" cy="3979625"/>
+          </a:xfrm>
+          <a:prstGeom prst="rect">
+            <a:avLst/>
+          </a:prstGeom>
+          <a:solidFill>
+            <a:srgbClr val="3E3423"/>
+          </a:solidFill>
+        </p:spPr>
+        <p:txBody>
+          <a:bodyPr vert="horz" wrap="square" lIns="0" tIns="0" rIns="0" bIns="0" rtlCol="0">
+            <a:normAutofit/>
+          </a:bodyPr>
+          <a:lstStyle>
+            <a:lvl1pPr marL="228600" indent="-228600" algn="l" defTabSz="914400" rtl="0" eaLnBrk="1" latinLnBrk="0" hangingPunct="1">
+              <a:lnSpc>
+                <a:spcPct val="110000"/>
+              </a:lnSpc>
+              <a:spcBef>
+                <a:spcPts val="1000"/>
+              </a:spcBef>
+              <a:spcAft>
+                <a:spcPts val="800"/>
+              </a:spcAft>
+              <a:buFont typeface="Arial" panose="020B0604020202020204" pitchFamily="34" charset="0"/>
+              <a:buChar char="•"/>
+              <a:defRPr sz="2400" kern="1200">
+                <a:solidFill>
+                  <a:schemeClr val="tx1">
+                    <a:alpha val="60000"/>
+                  </a:schemeClr>
+                </a:solidFill>
+                <a:latin typeface="+mn-lt"/>
+                <a:ea typeface="+mn-ea"/>
+                <a:cs typeface="+mn-cs"/>
+              </a:defRPr>
+            </a:lvl1pPr>
+            <a:lvl2pPr marL="685800" indent="-228600" algn="l" defTabSz="914400" rtl="0" eaLnBrk="1" latinLnBrk="0" hangingPunct="1">
+              <a:lnSpc>
+                <a:spcPct val="110000"/>
+              </a:lnSpc>
+              <a:spcBef>
+                <a:spcPts val="500"/>
+              </a:spcBef>
+              <a:spcAft>
+                <a:spcPts val="800"/>
+              </a:spcAft>
+              <a:buFont typeface="Arial" panose="020B0604020202020204" pitchFamily="34" charset="0"/>
+              <a:buChar char="•"/>
+              <a:defRPr sz="1600" kern="1200">
+                <a:solidFill>
+                  <a:schemeClr val="tx1">
+                    <a:alpha val="60000"/>
+                  </a:schemeClr>
+                </a:solidFill>
+                <a:latin typeface="+mn-lt"/>
+                <a:ea typeface="+mn-ea"/>
+                <a:cs typeface="+mn-cs"/>
+              </a:defRPr>
+            </a:lvl2pPr>
+            <a:lvl3pPr marL="1143000" indent="-228600" algn="l" defTabSz="914400" rtl="0" eaLnBrk="1" latinLnBrk="0" hangingPunct="1">
+              <a:lnSpc>
+                <a:spcPct val="110000"/>
+              </a:lnSpc>
+              <a:spcBef>
+                <a:spcPts val="500"/>
+              </a:spcBef>
+              <a:spcAft>
+                <a:spcPts val="800"/>
+              </a:spcAft>
+              <a:buFont typeface="Arial" panose="020B0604020202020204" pitchFamily="34" charset="0"/>
+              <a:buChar char="•"/>
+              <a:defRPr sz="1600" kern="1200">
+                <a:solidFill>
+                  <a:schemeClr val="tx1">
+                    <a:alpha val="60000"/>
+                  </a:schemeClr>
+                </a:solidFill>
+                <a:latin typeface="+mn-lt"/>
+                <a:ea typeface="+mn-ea"/>
+                <a:cs typeface="+mn-cs"/>
+              </a:defRPr>
+            </a:lvl3pPr>
+            <a:lvl4pPr marL="1600200" indent="-228600" algn="l" defTabSz="914400" rtl="0" eaLnBrk="1" latinLnBrk="0" hangingPunct="1">
+              <a:lnSpc>
+                <a:spcPct val="110000"/>
+              </a:lnSpc>
+              <a:spcBef>
+                <a:spcPts val="500"/>
+              </a:spcBef>
+              <a:spcAft>
+                <a:spcPts val="800"/>
+              </a:spcAft>
+              <a:buFont typeface="Arial" panose="020B0604020202020204" pitchFamily="34" charset="0"/>
+              <a:buChar char="•"/>
+              <a:defRPr sz="1600" kern="1200">
+                <a:solidFill>
+                  <a:schemeClr val="tx1">
+                    <a:alpha val="60000"/>
+                  </a:schemeClr>
+                </a:solidFill>
+                <a:latin typeface="+mn-lt"/>
+                <a:ea typeface="+mn-ea"/>
+                <a:cs typeface="+mn-cs"/>
+              </a:defRPr>
+            </a:lvl4pPr>
+            <a:lvl5pPr marL="2057400" indent="-228600" algn="l" defTabSz="914400" rtl="0" eaLnBrk="1" latinLnBrk="0" hangingPunct="1">
+              <a:lnSpc>
+                <a:spcPct val="110000"/>
+              </a:lnSpc>
+              <a:spcBef>
+                <a:spcPts val="500"/>
+              </a:spcBef>
+              <a:spcAft>
+                <a:spcPts val="800"/>
+              </a:spcAft>
+              <a:buFont typeface="Arial" panose="020B0604020202020204" pitchFamily="34" charset="0"/>
+              <a:buChar char="•"/>
+              <a:defRPr sz="1600" kern="1200">
+                <a:solidFill>
+                  <a:schemeClr val="tx1">
+                    <a:alpha val="60000"/>
+                  </a:schemeClr>
+                </a:solidFill>
+                <a:latin typeface="+mn-lt"/>
+                <a:ea typeface="+mn-ea"/>
+                <a:cs typeface="+mn-cs"/>
+              </a:defRPr>
+            </a:lvl5pPr>
+            <a:lvl6pPr marL="2514600" indent="-228600" algn="l" defTabSz="914400" rtl="0" eaLnBrk="1" latinLnBrk="0" hangingPunct="1">
+              <a:lnSpc>
+                <a:spcPct val="90000"/>
+              </a:lnSpc>
+              <a:spcBef>
+                <a:spcPts val="500"/>
+              </a:spcBef>
+              <a:buFont typeface="Arial" panose="020B0604020202020204" pitchFamily="34" charset="0"/>
+              <a:buChar char="•"/>
+              <a:defRPr sz="1800" kern="1200">
+                <a:solidFill>
+                  <a:schemeClr val="tx1"/>
+                </a:solidFill>
+                <a:latin typeface="+mn-lt"/>
+                <a:ea typeface="+mn-ea"/>
+                <a:cs typeface="+mn-cs"/>
+              </a:defRPr>
+            </a:lvl6pPr>
+            <a:lvl7pPr marL="2971800" indent="-228600" algn="l" defTabSz="914400" rtl="0" eaLnBrk="1" latinLnBrk="0" hangingPunct="1">
+              <a:lnSpc>
+                <a:spcPct val="90000"/>
+              </a:lnSpc>
+              <a:spcBef>
+                <a:spcPts val="500"/>
+              </a:spcBef>
+              <a:buFont typeface="Arial" panose="020B0604020202020204" pitchFamily="34" charset="0"/>
+              <a:buChar char="•"/>
+              <a:defRPr sz="1800" kern="1200">
+                <a:solidFill>
+                  <a:schemeClr val="tx1"/>
+                </a:solidFill>
+                <a:latin typeface="+mn-lt"/>
+                <a:ea typeface="+mn-ea"/>
+                <a:cs typeface="+mn-cs"/>
+              </a:defRPr>
+            </a:lvl7pPr>
+            <a:lvl8pPr marL="3429000" indent="-228600" algn="l" defTabSz="914400" rtl="0" eaLnBrk="1" latinLnBrk="0" hangingPunct="1">
+              <a:lnSpc>
+                <a:spcPct val="90000"/>
+              </a:lnSpc>
+              <a:spcBef>
+                <a:spcPts val="500"/>
+              </a:spcBef>
+              <a:buFont typeface="Arial" panose="020B0604020202020204" pitchFamily="34" charset="0"/>
+              <a:buChar char="•"/>
+              <a:defRPr sz="1800" kern="1200">
+                <a:solidFill>
+                  <a:schemeClr val="tx1"/>
+                </a:solidFill>
+                <a:latin typeface="+mn-lt"/>
+                <a:ea typeface="+mn-ea"/>
+                <a:cs typeface="+mn-cs"/>
+              </a:defRPr>
+            </a:lvl8pPr>
+            <a:lvl9pPr marL="3886200" indent="-228600" algn="l" defTabSz="914400" rtl="0" eaLnBrk="1" latinLnBrk="0" hangingPunct="1">
+              <a:lnSpc>
+                <a:spcPct val="90000"/>
+              </a:lnSpc>
+              <a:spcBef>
+                <a:spcPts val="500"/>
+              </a:spcBef>
+              <a:buFont typeface="Arial" panose="020B0604020202020204" pitchFamily="34" charset="0"/>
+              <a:buChar char="•"/>
+              <a:defRPr sz="1800" kern="1200">
+                <a:solidFill>
+                  <a:schemeClr val="tx1"/>
+                </a:solidFill>
+                <a:latin typeface="+mn-lt"/>
+                <a:ea typeface="+mn-ea"/>
+                <a:cs typeface="+mn-cs"/>
+              </a:defRPr>
+            </a:lvl9pPr>
+          </a:lstStyle>
+          <a:p>
+            <a:r>
+              <a:rPr lang="en-US" dirty="0"/>
+              <a:t>Version control system, which tracks changes in code</a:t>
             </a:r>
           </a:p>
           <a:p>
@@ -8677,7 +8915,7 @@
         </p:blipFill>
         <p:spPr>
           <a:xfrm>
-            <a:off x="0" y="1458642"/>
+            <a:off x="0" y="1393001"/>
             <a:ext cx="12192000" cy="2549236"/>
           </a:xfrm>
           <a:prstGeom prst="rect">
@@ -8762,6 +9000,63 @@
           </a:prstGeom>
         </p:spPr>
       </p:pic>
+      <p:sp>
+        <p:nvSpPr>
+          <p:cNvPr id="10" name="Title 1">
+            <a:extLst>
+              <a:ext uri="{FF2B5EF4-FFF2-40B4-BE49-F238E27FC236}">
+                <a16:creationId xmlns:a16="http://schemas.microsoft.com/office/drawing/2014/main" id="{C59747AD-48A7-41A9-B7FA-259623F9550F}"/>
+              </a:ext>
+            </a:extLst>
+          </p:cNvPr>
+          <p:cNvSpPr txBox="1">
+            <a:spLocks/>
+          </p:cNvSpPr>
+          <p:nvPr/>
+        </p:nvSpPr>
+        <p:spPr>
+          <a:xfrm>
+            <a:off x="549537" y="520685"/>
+            <a:ext cx="11091600" cy="785601"/>
+          </a:xfrm>
+          <a:prstGeom prst="rect">
+            <a:avLst/>
+          </a:prstGeom>
+          <a:solidFill>
+            <a:srgbClr val="3E3423"/>
+          </a:solidFill>
+        </p:spPr>
+        <p:txBody>
+          <a:bodyPr vert="horz" wrap="square" lIns="0" tIns="0" rIns="0" bIns="0" rtlCol="0" anchor="t" anchorCtr="0">
+            <a:normAutofit/>
+          </a:bodyPr>
+          <a:lstStyle>
+            <a:lvl1pPr algn="l" defTabSz="914400" rtl="0" eaLnBrk="1" latinLnBrk="0" hangingPunct="1">
+              <a:lnSpc>
+                <a:spcPct val="100000"/>
+              </a:lnSpc>
+              <a:spcBef>
+                <a:spcPct val="0"/>
+              </a:spcBef>
+              <a:buNone/>
+              <a:defRPr lang="en-US" sz="4800" kern="1200" dirty="0">
+                <a:solidFill>
+                  <a:schemeClr val="tx1"/>
+                </a:solidFill>
+                <a:latin typeface="+mj-lt"/>
+                <a:ea typeface="+mj-ea"/>
+                <a:cs typeface="+mj-cs"/>
+              </a:defRPr>
+            </a:lvl1pPr>
+          </a:lstStyle>
+          <a:p>
+            <a:r>
+              <a:rPr lang="en-US" dirty="0"/>
+              <a:t>What is Git? </a:t>
+            </a:r>
+          </a:p>
+        </p:txBody>
+      </p:sp>
     </p:spTree>
     <p:extLst>
       <p:ext uri="{BB962C8B-B14F-4D97-AF65-F5344CB8AC3E}">
@@ -8846,26 +9141,35 @@
                                   </p:childTnLst>
                                 </p:cTn>
                               </p:par>
-                            </p:childTnLst>
-                          </p:cTn>
-                        </p:par>
-                      </p:childTnLst>
-                    </p:cTn>
-                  </p:par>
-                  <p:par>
-                    <p:cTn id="9" fill="hold">
-                      <p:stCondLst>
-                        <p:cond delay="indefinite"/>
-                      </p:stCondLst>
-                      <p:childTnLst>
-                        <p:par>
-                          <p:cTn id="10" fill="hold">
-                            <p:stCondLst>
-                              <p:cond delay="0"/>
-                            </p:stCondLst>
-                            <p:childTnLst>
                               <p:par>
-                                <p:cTn id="11" presetID="1" presetClass="entr" presetSubtype="0" fill="hold" nodeType="clickEffect">
+                                <p:cTn id="9" presetID="1" presetClass="entr" presetSubtype="0" fill="hold" grpId="0" nodeType="withEffect">
+                                  <p:stCondLst>
+                                    <p:cond delay="0"/>
+                                  </p:stCondLst>
+                                  <p:childTnLst>
+                                    <p:set>
+                                      <p:cBhvr>
+                                        <p:cTn id="10" dur="1" fill="hold">
+                                          <p:stCondLst>
+                                            <p:cond delay="0"/>
+                                          </p:stCondLst>
+                                        </p:cTn>
+                                        <p:tgtEl>
+                                          <p:spTgt spid="10"/>
+                                        </p:tgtEl>
+                                        <p:attrNameLst>
+                                          <p:attrName>style.visibility</p:attrName>
+                                        </p:attrNameLst>
+                                      </p:cBhvr>
+                                      <p:to>
+                                        <p:strVal val="visible"/>
+                                      </p:to>
+                                    </p:set>
+                                  </p:childTnLst>
+                                </p:cTn>
+                              </p:par>
+                              <p:par>
+                                <p:cTn id="11" presetID="1" presetClass="entr" presetSubtype="0" fill="hold" grpId="0" nodeType="withEffect">
                                   <p:stCondLst>
                                     <p:cond delay="0"/>
                                   </p:stCondLst>
@@ -8878,7 +9182,7 @@
                                           </p:stCondLst>
                                         </p:cTn>
                                         <p:tgtEl>
-                                          <p:spTgt spid="9"/>
+                                          <p:spTgt spid="11"/>
                                         </p:tgtEl>
                                         <p:attrNameLst>
                                           <p:attrName>style.visibility</p:attrName>
@@ -8918,6 +9222,51 @@
                                     <p:set>
                                       <p:cBhvr>
                                         <p:cTn id="16" dur="1" fill="hold">
+                                          <p:stCondLst>
+                                            <p:cond delay="0"/>
+                                          </p:stCondLst>
+                                        </p:cTn>
+                                        <p:tgtEl>
+                                          <p:spTgt spid="9"/>
+                                        </p:tgtEl>
+                                        <p:attrNameLst>
+                                          <p:attrName>style.visibility</p:attrName>
+                                        </p:attrNameLst>
+                                      </p:cBhvr>
+                                      <p:to>
+                                        <p:strVal val="visible"/>
+                                      </p:to>
+                                    </p:set>
+                                  </p:childTnLst>
+                                </p:cTn>
+                              </p:par>
+                            </p:childTnLst>
+                          </p:cTn>
+                        </p:par>
+                      </p:childTnLst>
+                    </p:cTn>
+                  </p:par>
+                  <p:par>
+                    <p:cTn id="17" fill="hold">
+                      <p:stCondLst>
+                        <p:cond delay="indefinite"/>
+                      </p:stCondLst>
+                      <p:childTnLst>
+                        <p:par>
+                          <p:cTn id="18" fill="hold">
+                            <p:stCondLst>
+                              <p:cond delay="0"/>
+                            </p:stCondLst>
+                            <p:childTnLst>
+                              <p:par>
+                                <p:cTn id="19" presetID="1" presetClass="entr" presetSubtype="0" fill="hold" nodeType="clickEffect">
+                                  <p:stCondLst>
+                                    <p:cond delay="0"/>
+                                  </p:stCondLst>
+                                  <p:childTnLst>
+                                    <p:set>
+                                      <p:cBhvr>
+                                        <p:cTn id="20" dur="1" fill="hold">
                                           <p:stCondLst>
                                             <p:cond delay="0"/>
                                           </p:stCondLst>
@@ -8963,6 +9312,10 @@
         </p:cTn>
       </p:par>
     </p:tnLst>
+    <p:bldLst>
+      <p:bldP spid="11" grpId="0" animBg="1"/>
+      <p:bldP spid="10" grpId="0" animBg="1"/>
+    </p:bldLst>
   </p:timing>
 </p:sld>
 </file>
@@ -9688,6 +10041,17 @@
               <a:rPr lang="en-US" dirty="0"/>
               <a:t>Can’t render everything</a:t>
             </a:r>
+          </a:p>
+          <a:p>
+            <a:r>
+              <a:rPr lang="en-US" dirty="0"/>
+              <a:t>Static content (but there </a:t>
+            </a:r>
+            <a:r>
+              <a:rPr lang="en-US"/>
+              <a:t>are workarounds)</a:t>
+            </a:r>
+            <a:endParaRPr lang="en-US" dirty="0"/>
           </a:p>
           <a:p>
             <a:r>

</xml_diff>

<commit_message>
update dir in certainty nb
</commit_message>
<xml_diff>
--- a/Github and jupyter.pptx
+++ b/Github and jupyter.pptx
@@ -10045,13 +10045,8 @@
           <a:p>
             <a:r>
               <a:rPr lang="en-US" dirty="0"/>
-              <a:t>Static content (but there </a:t>
-            </a:r>
-            <a:r>
-              <a:rPr lang="en-US"/>
-              <a:t>are workarounds)</a:t>
-            </a:r>
-            <a:endParaRPr lang="en-US" dirty="0"/>
+              <a:t>Static content (but there are workarounds)</a:t>
+            </a:r>
           </a:p>
           <a:p>
             <a:r>
@@ -10522,7 +10517,7 @@
         <p:spPr>
           <a:xfrm>
             <a:off x="660194" y="1606303"/>
-            <a:ext cx="11090274" cy="3979625"/>
+            <a:ext cx="11090274" cy="4535775"/>
           </a:xfrm>
         </p:spPr>
         <p:txBody>
@@ -10565,6 +10560,13 @@
             <a:r>
               <a:rPr lang="en-US" dirty="0"/>
               <a:t>Need to remember to save</a:t>
+            </a:r>
+          </a:p>
+          <a:p>
+            <a:pPr lvl="1"/>
+            <a:r>
+              <a:rPr lang="en-US" dirty="0"/>
+              <a:t>Also need to shutdown</a:t>
             </a:r>
           </a:p>
           <a:p>

</xml_diff>